<commit_message>
Random walks starting at later timesteps
</commit_message>
<xml_diff>
--- a/Presentation/Presentation AdjointMC.pptx
+++ b/Presentation/Presentation AdjointMC.pptx
@@ -13,10 +13,10 @@
     <p:sldMasterId id="2147483849" r:id="rId9"/>
   </p:sldMasterIdLst>
   <p:notesMasterIdLst>
-    <p:notesMasterId r:id="rId22"/>
+    <p:notesMasterId r:id="rId30"/>
   </p:notesMasterIdLst>
   <p:handoutMasterIdLst>
-    <p:handoutMasterId r:id="rId23"/>
+    <p:handoutMasterId r:id="rId31"/>
   </p:handoutMasterIdLst>
   <p:sldIdLst>
     <p:sldId id="268" r:id="rId10"/>
@@ -31,6 +31,14 @@
     <p:sldId id="277" r:id="rId19"/>
     <p:sldId id="278" r:id="rId20"/>
     <p:sldId id="279" r:id="rId21"/>
+    <p:sldId id="280" r:id="rId22"/>
+    <p:sldId id="281" r:id="rId23"/>
+    <p:sldId id="282" r:id="rId24"/>
+    <p:sldId id="283" r:id="rId25"/>
+    <p:sldId id="284" r:id="rId26"/>
+    <p:sldId id="285" r:id="rId27"/>
+    <p:sldId id="286" r:id="rId28"/>
+    <p:sldId id="287" r:id="rId29"/>
   </p:sldIdLst>
   <p:sldSz cx="12187238" cy="6858000"/>
   <p:notesSz cx="7099300" cy="10234613"/>
@@ -42213,7 +42221,7 @@
         </p:blipFill>
         <p:spPr>
           <a:xfrm>
-            <a:off x="2573735" y="1625168"/>
+            <a:off x="2572147" y="1340768"/>
             <a:ext cx="7041356" cy="1623476"/>
           </a:xfrm>
           <a:prstGeom prst="rect">
@@ -42249,7 +42257,7 @@
         </p:blipFill>
         <p:spPr>
           <a:xfrm>
-            <a:off x="3140726" y="3378155"/>
+            <a:off x="3140726" y="3203968"/>
             <a:ext cx="5904198" cy="2849336"/>
           </a:xfrm>
           <a:prstGeom prst="rect">
@@ -42302,6 +42310,1795 @@
     <p:extLst>
       <p:ext uri="{BB962C8B-B14F-4D97-AF65-F5344CB8AC3E}">
         <p14:creationId xmlns:p14="http://schemas.microsoft.com/office/powerpoint/2010/main" val="2920001202"/>
+      </p:ext>
+    </p:extLst>
+  </p:cSld>
+  <p:clrMapOvr>
+    <a:masterClrMapping/>
+  </p:clrMapOvr>
+  <p:transition>
+    <p:fade/>
+  </p:transition>
+</p:sld>
+</file>
+
+<file path=ppt/slides/slide13.xml><?xml version="1.0" encoding="utf-8"?>
+<p:sld xmlns:a="http://schemas.openxmlformats.org/drawingml/2006/main" xmlns:r="http://schemas.openxmlformats.org/officeDocument/2006/relationships" xmlns:p="http://schemas.openxmlformats.org/presentationml/2006/main">
+  <p:cSld>
+    <p:spTree>
+      <p:nvGrpSpPr>
+        <p:cNvPr id="1" name=""/>
+        <p:cNvGrpSpPr/>
+        <p:nvPr/>
+      </p:nvGrpSpPr>
+      <p:grpSpPr>
+        <a:xfrm>
+          <a:off x="0" y="0"/>
+          <a:ext cx="0" cy="0"/>
+          <a:chOff x="0" y="0"/>
+          <a:chExt cx="0" cy="0"/>
+        </a:xfrm>
+      </p:grpSpPr>
+      <p:sp>
+        <p:nvSpPr>
+          <p:cNvPr id="3" name="Datumsplatzhalter 2">
+            <a:extLst>
+              <a:ext uri="{FF2B5EF4-FFF2-40B4-BE49-F238E27FC236}">
+                <a16:creationId xmlns:a16="http://schemas.microsoft.com/office/drawing/2014/main" id="{2A3B4092-E028-474C-A72A-B164D068793F}"/>
+              </a:ext>
+            </a:extLst>
+          </p:cNvPr>
+          <p:cNvSpPr>
+            <a:spLocks noGrp="1"/>
+          </p:cNvSpPr>
+          <p:nvPr>
+            <p:ph type="dt" sz="half" idx="10"/>
+          </p:nvPr>
+        </p:nvSpPr>
+        <p:spPr/>
+        <p:txBody>
+          <a:bodyPr/>
+          <a:lstStyle/>
+          <a:p>
+            <a:fld id="{CA19FB8E-A97D-E34E-9EA9-C874AD42758F}" type="datetime1">
+              <a:rPr lang="de-CH" smtClean="0"/>
+              <a:t>23.05.18</a:t>
+            </a:fld>
+            <a:endParaRPr lang="en-GB" dirty="0"/>
+          </a:p>
+        </p:txBody>
+      </p:sp>
+      <p:sp>
+        <p:nvSpPr>
+          <p:cNvPr id="4" name="Fußzeilenplatzhalter 3">
+            <a:extLst>
+              <a:ext uri="{FF2B5EF4-FFF2-40B4-BE49-F238E27FC236}">
+                <a16:creationId xmlns:a16="http://schemas.microsoft.com/office/drawing/2014/main" id="{4A9B2360-F4D9-AE4C-9EEC-A4CFBA2033D3}"/>
+              </a:ext>
+            </a:extLst>
+          </p:cNvPr>
+          <p:cNvSpPr>
+            <a:spLocks noGrp="1"/>
+          </p:cNvSpPr>
+          <p:nvPr>
+            <p:ph type="ftr" sz="quarter" idx="11"/>
+          </p:nvPr>
+        </p:nvSpPr>
+        <p:spPr/>
+        <p:txBody>
+          <a:bodyPr/>
+          <a:lstStyle/>
+          <a:p>
+            <a:r>
+              <a:rPr lang="en-GB"/>
+              <a:t>Stefano Weidmann</a:t>
+            </a:r>
+            <a:endParaRPr lang="en-GB" dirty="0"/>
+          </a:p>
+        </p:txBody>
+      </p:sp>
+      <p:sp>
+        <p:nvSpPr>
+          <p:cNvPr id="5" name="Foliennummernplatzhalter 4">
+            <a:extLst>
+              <a:ext uri="{FF2B5EF4-FFF2-40B4-BE49-F238E27FC236}">
+                <a16:creationId xmlns:a16="http://schemas.microsoft.com/office/drawing/2014/main" id="{1A492E0F-5C26-BB4B-B069-FD5C51B9601C}"/>
+              </a:ext>
+            </a:extLst>
+          </p:cNvPr>
+          <p:cNvSpPr>
+            <a:spLocks noGrp="1"/>
+          </p:cNvSpPr>
+          <p:nvPr>
+            <p:ph type="sldNum" sz="quarter" idx="12"/>
+          </p:nvPr>
+        </p:nvSpPr>
+        <p:spPr/>
+        <p:txBody>
+          <a:bodyPr/>
+          <a:lstStyle/>
+          <a:p>
+            <a:fld id="{6C6AE60A-B69C-4790-82F7-3882EDF23186}" type="slidenum">
+              <a:rPr lang="en-GB" smtClean="0"/>
+              <a:t>13</a:t>
+            </a:fld>
+            <a:endParaRPr lang="en-GB" dirty="0"/>
+          </a:p>
+        </p:txBody>
+      </p:sp>
+      <p:sp>
+        <p:nvSpPr>
+          <p:cNvPr id="6" name="Titel 5">
+            <a:extLst>
+              <a:ext uri="{FF2B5EF4-FFF2-40B4-BE49-F238E27FC236}">
+                <a16:creationId xmlns:a16="http://schemas.microsoft.com/office/drawing/2014/main" id="{093E6871-1294-6A46-B292-075EEB8628C0}"/>
+              </a:ext>
+            </a:extLst>
+          </p:cNvPr>
+          <p:cNvSpPr>
+            <a:spLocks noGrp="1"/>
+          </p:cNvSpPr>
+          <p:nvPr>
+            <p:ph type="title"/>
+          </p:nvPr>
+        </p:nvSpPr>
+        <p:spPr/>
+        <p:txBody>
+          <a:bodyPr/>
+          <a:lstStyle/>
+          <a:p>
+            <a:r>
+              <a:rPr lang="en-US" dirty="0"/>
+              <a:t>Adjoint</a:t>
+            </a:r>
+          </a:p>
+        </p:txBody>
+      </p:sp>
+      <p:pic>
+        <p:nvPicPr>
+          <p:cNvPr id="12" name="Grafik 11">
+            <a:extLst>
+              <a:ext uri="{FF2B5EF4-FFF2-40B4-BE49-F238E27FC236}">
+                <a16:creationId xmlns:a16="http://schemas.microsoft.com/office/drawing/2014/main" id="{699C69A1-1A8B-F94F-9CBF-A19DC0C84D27}"/>
+              </a:ext>
+            </a:extLst>
+          </p:cNvPr>
+          <p:cNvPicPr>
+            <a:picLocks noChangeAspect="1"/>
+          </p:cNvPicPr>
+          <p:nvPr/>
+        </p:nvPicPr>
+        <p:blipFill>
+          <a:blip r:embed="rId2">
+            <a:extLst>
+              <a:ext uri="{28A0092B-C50C-407E-A947-70E740481C1C}">
+                <a14:useLocalDpi xmlns:a14="http://schemas.microsoft.com/office/drawing/2010/main" val="0"/>
+              </a:ext>
+            </a:extLst>
+          </a:blip>
+          <a:stretch>
+            <a:fillRect/>
+          </a:stretch>
+        </p:blipFill>
+        <p:spPr>
+          <a:xfrm>
+            <a:off x="3140726" y="1268760"/>
+            <a:ext cx="5904198" cy="2849336"/>
+          </a:xfrm>
+          <a:prstGeom prst="rect">
+            <a:avLst/>
+          </a:prstGeom>
+        </p:spPr>
+      </p:pic>
+      <p:sp>
+        <p:nvSpPr>
+          <p:cNvPr id="14" name="Textfeld 13">
+            <a:extLst>
+              <a:ext uri="{FF2B5EF4-FFF2-40B4-BE49-F238E27FC236}">
+                <a16:creationId xmlns:a16="http://schemas.microsoft.com/office/drawing/2014/main" id="{E2BEB42B-D84C-8947-9B2D-FA203D214763}"/>
+              </a:ext>
+            </a:extLst>
+          </p:cNvPr>
+          <p:cNvSpPr txBox="1"/>
+          <p:nvPr/>
+        </p:nvSpPr>
+        <p:spPr>
+          <a:xfrm>
+            <a:off x="1277467" y="6276460"/>
+            <a:ext cx="10284522" cy="276999"/>
+          </a:xfrm>
+          <a:prstGeom prst="rect">
+            <a:avLst/>
+          </a:prstGeom>
+          <a:noFill/>
+        </p:spPr>
+        <p:txBody>
+          <a:bodyPr wrap="square" rtlCol="0">
+            <a:spAutoFit/>
+          </a:bodyPr>
+          <a:lstStyle/>
+          <a:p>
+            <a:r>
+              <a:rPr lang="en-US" sz="1200" dirty="0">
+                <a:solidFill>
+                  <a:schemeClr val="bg2">
+                    <a:lumMod val="50000"/>
+                  </a:schemeClr>
+                </a:solidFill>
+              </a:rPr>
+              <a:t>Linear system of equation included from main paper (see title slide)</a:t>
+            </a:r>
+          </a:p>
+        </p:txBody>
+      </p:sp>
+      <p:pic>
+        <p:nvPicPr>
+          <p:cNvPr id="2" name="Grafik 1">
+            <a:extLst>
+              <a:ext uri="{FF2B5EF4-FFF2-40B4-BE49-F238E27FC236}">
+                <a16:creationId xmlns:a16="http://schemas.microsoft.com/office/drawing/2014/main" id="{D120210C-F698-5446-BF8D-EAB8A361A047}"/>
+              </a:ext>
+            </a:extLst>
+          </p:cNvPr>
+          <p:cNvPicPr>
+            <a:picLocks noChangeAspect="1"/>
+          </p:cNvPicPr>
+          <p:nvPr/>
+        </p:nvPicPr>
+        <p:blipFill>
+          <a:blip r:embed="rId3"/>
+          <a:stretch>
+            <a:fillRect/>
+          </a:stretch>
+        </p:blipFill>
+        <p:spPr>
+          <a:xfrm>
+            <a:off x="1277467" y="4981378"/>
+            <a:ext cx="10058400" cy="431800"/>
+          </a:xfrm>
+          <a:prstGeom prst="rect">
+            <a:avLst/>
+          </a:prstGeom>
+        </p:spPr>
+      </p:pic>
+    </p:spTree>
+    <p:extLst>
+      <p:ext uri="{BB962C8B-B14F-4D97-AF65-F5344CB8AC3E}">
+        <p14:creationId xmlns:p14="http://schemas.microsoft.com/office/powerpoint/2010/main" val="3327732188"/>
+      </p:ext>
+    </p:extLst>
+  </p:cSld>
+  <p:clrMapOvr>
+    <a:masterClrMapping/>
+  </p:clrMapOvr>
+  <p:transition>
+    <p:fade/>
+  </p:transition>
+</p:sld>
+</file>
+
+<file path=ppt/slides/slide14.xml><?xml version="1.0" encoding="utf-8"?>
+<p:sld xmlns:a="http://schemas.openxmlformats.org/drawingml/2006/main" xmlns:r="http://schemas.openxmlformats.org/officeDocument/2006/relationships" xmlns:p="http://schemas.openxmlformats.org/presentationml/2006/main">
+  <p:cSld>
+    <p:spTree>
+      <p:nvGrpSpPr>
+        <p:cNvPr id="1" name=""/>
+        <p:cNvGrpSpPr/>
+        <p:nvPr/>
+      </p:nvGrpSpPr>
+      <p:grpSpPr>
+        <a:xfrm>
+          <a:off x="0" y="0"/>
+          <a:ext cx="0" cy="0"/>
+          <a:chOff x="0" y="0"/>
+          <a:chExt cx="0" cy="0"/>
+        </a:xfrm>
+      </p:grpSpPr>
+      <p:sp>
+        <p:nvSpPr>
+          <p:cNvPr id="3" name="Datumsplatzhalter 2">
+            <a:extLst>
+              <a:ext uri="{FF2B5EF4-FFF2-40B4-BE49-F238E27FC236}">
+                <a16:creationId xmlns:a16="http://schemas.microsoft.com/office/drawing/2014/main" id="{2A3B4092-E028-474C-A72A-B164D068793F}"/>
+              </a:ext>
+            </a:extLst>
+          </p:cNvPr>
+          <p:cNvSpPr>
+            <a:spLocks noGrp="1"/>
+          </p:cNvSpPr>
+          <p:nvPr>
+            <p:ph type="dt" sz="half" idx="10"/>
+          </p:nvPr>
+        </p:nvSpPr>
+        <p:spPr/>
+        <p:txBody>
+          <a:bodyPr/>
+          <a:lstStyle/>
+          <a:p>
+            <a:fld id="{CA19FB8E-A97D-E34E-9EA9-C874AD42758F}" type="datetime1">
+              <a:rPr lang="de-CH" smtClean="0"/>
+              <a:t>23.05.18</a:t>
+            </a:fld>
+            <a:endParaRPr lang="en-GB" dirty="0"/>
+          </a:p>
+        </p:txBody>
+      </p:sp>
+      <p:sp>
+        <p:nvSpPr>
+          <p:cNvPr id="4" name="Fußzeilenplatzhalter 3">
+            <a:extLst>
+              <a:ext uri="{FF2B5EF4-FFF2-40B4-BE49-F238E27FC236}">
+                <a16:creationId xmlns:a16="http://schemas.microsoft.com/office/drawing/2014/main" id="{4A9B2360-F4D9-AE4C-9EEC-A4CFBA2033D3}"/>
+              </a:ext>
+            </a:extLst>
+          </p:cNvPr>
+          <p:cNvSpPr>
+            <a:spLocks noGrp="1"/>
+          </p:cNvSpPr>
+          <p:nvPr>
+            <p:ph type="ftr" sz="quarter" idx="11"/>
+          </p:nvPr>
+        </p:nvSpPr>
+        <p:spPr/>
+        <p:txBody>
+          <a:bodyPr/>
+          <a:lstStyle/>
+          <a:p>
+            <a:r>
+              <a:rPr lang="en-GB"/>
+              <a:t>Stefano Weidmann</a:t>
+            </a:r>
+            <a:endParaRPr lang="en-GB" dirty="0"/>
+          </a:p>
+        </p:txBody>
+      </p:sp>
+      <p:sp>
+        <p:nvSpPr>
+          <p:cNvPr id="5" name="Foliennummernplatzhalter 4">
+            <a:extLst>
+              <a:ext uri="{FF2B5EF4-FFF2-40B4-BE49-F238E27FC236}">
+                <a16:creationId xmlns:a16="http://schemas.microsoft.com/office/drawing/2014/main" id="{1A492E0F-5C26-BB4B-B069-FD5C51B9601C}"/>
+              </a:ext>
+            </a:extLst>
+          </p:cNvPr>
+          <p:cNvSpPr>
+            <a:spLocks noGrp="1"/>
+          </p:cNvSpPr>
+          <p:nvPr>
+            <p:ph type="sldNum" sz="quarter" idx="12"/>
+          </p:nvPr>
+        </p:nvSpPr>
+        <p:spPr/>
+        <p:txBody>
+          <a:bodyPr/>
+          <a:lstStyle/>
+          <a:p>
+            <a:fld id="{6C6AE60A-B69C-4790-82F7-3882EDF23186}" type="slidenum">
+              <a:rPr lang="en-GB" smtClean="0"/>
+              <a:t>14</a:t>
+            </a:fld>
+            <a:endParaRPr lang="en-GB" dirty="0"/>
+          </a:p>
+        </p:txBody>
+      </p:sp>
+      <p:sp>
+        <p:nvSpPr>
+          <p:cNvPr id="6" name="Titel 5">
+            <a:extLst>
+              <a:ext uri="{FF2B5EF4-FFF2-40B4-BE49-F238E27FC236}">
+                <a16:creationId xmlns:a16="http://schemas.microsoft.com/office/drawing/2014/main" id="{093E6871-1294-6A46-B292-075EEB8628C0}"/>
+              </a:ext>
+            </a:extLst>
+          </p:cNvPr>
+          <p:cNvSpPr>
+            <a:spLocks noGrp="1"/>
+          </p:cNvSpPr>
+          <p:nvPr>
+            <p:ph type="title"/>
+          </p:nvPr>
+        </p:nvSpPr>
+        <p:spPr/>
+        <p:txBody>
+          <a:bodyPr/>
+          <a:lstStyle/>
+          <a:p>
+            <a:r>
+              <a:rPr lang="en-US" dirty="0"/>
+              <a:t>Adjoint</a:t>
+            </a:r>
+          </a:p>
+        </p:txBody>
+      </p:sp>
+      <p:sp>
+        <p:nvSpPr>
+          <p:cNvPr id="14" name="Textfeld 13">
+            <a:extLst>
+              <a:ext uri="{FF2B5EF4-FFF2-40B4-BE49-F238E27FC236}">
+                <a16:creationId xmlns:a16="http://schemas.microsoft.com/office/drawing/2014/main" id="{E2BEB42B-D84C-8947-9B2D-FA203D214763}"/>
+              </a:ext>
+            </a:extLst>
+          </p:cNvPr>
+          <p:cNvSpPr txBox="1"/>
+          <p:nvPr/>
+        </p:nvSpPr>
+        <p:spPr>
+          <a:xfrm>
+            <a:off x="1277467" y="6276460"/>
+            <a:ext cx="10284522" cy="276999"/>
+          </a:xfrm>
+          <a:prstGeom prst="rect">
+            <a:avLst/>
+          </a:prstGeom>
+          <a:noFill/>
+        </p:spPr>
+        <p:txBody>
+          <a:bodyPr wrap="square" rtlCol="0">
+            <a:spAutoFit/>
+          </a:bodyPr>
+          <a:lstStyle/>
+          <a:p>
+            <a:r>
+              <a:rPr lang="en-US" sz="1200" dirty="0">
+                <a:solidFill>
+                  <a:schemeClr val="bg2">
+                    <a:lumMod val="50000"/>
+                  </a:schemeClr>
+                </a:solidFill>
+              </a:rPr>
+              <a:t>Linear system of equation included from main paper (see title slide)</a:t>
+            </a:r>
+          </a:p>
+        </p:txBody>
+      </p:sp>
+      <p:pic>
+        <p:nvPicPr>
+          <p:cNvPr id="9" name="Grafik 8">
+            <a:extLst>
+              <a:ext uri="{FF2B5EF4-FFF2-40B4-BE49-F238E27FC236}">
+                <a16:creationId xmlns:a16="http://schemas.microsoft.com/office/drawing/2014/main" id="{BB2DA093-8657-A346-8F13-2187FEE747A2}"/>
+              </a:ext>
+            </a:extLst>
+          </p:cNvPr>
+          <p:cNvPicPr>
+            <a:picLocks noChangeAspect="1"/>
+          </p:cNvPicPr>
+          <p:nvPr/>
+        </p:nvPicPr>
+        <p:blipFill>
+          <a:blip r:embed="rId2">
+            <a:extLst>
+              <a:ext uri="{28A0092B-C50C-407E-A947-70E740481C1C}">
+                <a14:useLocalDpi xmlns:a14="http://schemas.microsoft.com/office/drawing/2010/main" val="0"/>
+              </a:ext>
+            </a:extLst>
+          </a:blip>
+          <a:stretch>
+            <a:fillRect/>
+          </a:stretch>
+        </p:blipFill>
+        <p:spPr>
+          <a:xfrm>
+            <a:off x="764590" y="1215883"/>
+            <a:ext cx="5630338" cy="2717173"/>
+          </a:xfrm>
+          <a:prstGeom prst="rect">
+            <a:avLst/>
+          </a:prstGeom>
+        </p:spPr>
+      </p:pic>
+      <p:pic>
+        <p:nvPicPr>
+          <p:cNvPr id="7" name="Grafik 6">
+            <a:extLst>
+              <a:ext uri="{FF2B5EF4-FFF2-40B4-BE49-F238E27FC236}">
+                <a16:creationId xmlns:a16="http://schemas.microsoft.com/office/drawing/2014/main" id="{FBC36F5E-F91C-9A40-822F-FB469053AFB1}"/>
+              </a:ext>
+            </a:extLst>
+          </p:cNvPr>
+          <p:cNvPicPr>
+            <a:picLocks noChangeAspect="1"/>
+          </p:cNvPicPr>
+          <p:nvPr/>
+        </p:nvPicPr>
+        <p:blipFill>
+          <a:blip r:embed="rId3"/>
+          <a:stretch>
+            <a:fillRect/>
+          </a:stretch>
+        </p:blipFill>
+        <p:spPr>
+          <a:xfrm>
+            <a:off x="764588" y="4572302"/>
+            <a:ext cx="7197935" cy="728905"/>
+          </a:xfrm>
+          <a:prstGeom prst="rect">
+            <a:avLst/>
+          </a:prstGeom>
+        </p:spPr>
+      </p:pic>
+      <p:pic>
+        <p:nvPicPr>
+          <p:cNvPr id="8" name="Grafik 7">
+            <a:extLst>
+              <a:ext uri="{FF2B5EF4-FFF2-40B4-BE49-F238E27FC236}">
+                <a16:creationId xmlns:a16="http://schemas.microsoft.com/office/drawing/2014/main" id="{69C087EF-6A32-F74C-B1C8-229C16A8D25E}"/>
+              </a:ext>
+            </a:extLst>
+          </p:cNvPr>
+          <p:cNvPicPr>
+            <a:picLocks noChangeAspect="1"/>
+          </p:cNvPicPr>
+          <p:nvPr/>
+        </p:nvPicPr>
+        <p:blipFill>
+          <a:blip r:embed="rId4"/>
+          <a:stretch>
+            <a:fillRect/>
+          </a:stretch>
+        </p:blipFill>
+        <p:spPr>
+          <a:xfrm>
+            <a:off x="7962523" y="2387802"/>
+            <a:ext cx="3276600" cy="1104900"/>
+          </a:xfrm>
+          <a:prstGeom prst="rect">
+            <a:avLst/>
+          </a:prstGeom>
+        </p:spPr>
+      </p:pic>
+    </p:spTree>
+    <p:extLst>
+      <p:ext uri="{BB962C8B-B14F-4D97-AF65-F5344CB8AC3E}">
+        <p14:creationId xmlns:p14="http://schemas.microsoft.com/office/powerpoint/2010/main" val="2991180994"/>
+      </p:ext>
+    </p:extLst>
+  </p:cSld>
+  <p:clrMapOvr>
+    <a:masterClrMapping/>
+  </p:clrMapOvr>
+  <p:transition>
+    <p:fade/>
+  </p:transition>
+</p:sld>
+</file>
+
+<file path=ppt/slides/slide15.xml><?xml version="1.0" encoding="utf-8"?>
+<p:sld xmlns:a="http://schemas.openxmlformats.org/drawingml/2006/main" xmlns:r="http://schemas.openxmlformats.org/officeDocument/2006/relationships" xmlns:p="http://schemas.openxmlformats.org/presentationml/2006/main">
+  <p:cSld>
+    <p:spTree>
+      <p:nvGrpSpPr>
+        <p:cNvPr id="1" name=""/>
+        <p:cNvGrpSpPr/>
+        <p:nvPr/>
+      </p:nvGrpSpPr>
+      <p:grpSpPr>
+        <a:xfrm>
+          <a:off x="0" y="0"/>
+          <a:ext cx="0" cy="0"/>
+          <a:chOff x="0" y="0"/>
+          <a:chExt cx="0" cy="0"/>
+        </a:xfrm>
+      </p:grpSpPr>
+      <p:sp>
+        <p:nvSpPr>
+          <p:cNvPr id="3" name="Datumsplatzhalter 2">
+            <a:extLst>
+              <a:ext uri="{FF2B5EF4-FFF2-40B4-BE49-F238E27FC236}">
+                <a16:creationId xmlns:a16="http://schemas.microsoft.com/office/drawing/2014/main" id="{2A3B4092-E028-474C-A72A-B164D068793F}"/>
+              </a:ext>
+            </a:extLst>
+          </p:cNvPr>
+          <p:cNvSpPr>
+            <a:spLocks noGrp="1"/>
+          </p:cNvSpPr>
+          <p:nvPr>
+            <p:ph type="dt" sz="half" idx="10"/>
+          </p:nvPr>
+        </p:nvSpPr>
+        <p:spPr/>
+        <p:txBody>
+          <a:bodyPr/>
+          <a:lstStyle/>
+          <a:p>
+            <a:fld id="{CA19FB8E-A97D-E34E-9EA9-C874AD42758F}" type="datetime1">
+              <a:rPr lang="de-CH" smtClean="0"/>
+              <a:t>23.05.18</a:t>
+            </a:fld>
+            <a:endParaRPr lang="en-GB" dirty="0"/>
+          </a:p>
+        </p:txBody>
+      </p:sp>
+      <p:sp>
+        <p:nvSpPr>
+          <p:cNvPr id="4" name="Fußzeilenplatzhalter 3">
+            <a:extLst>
+              <a:ext uri="{FF2B5EF4-FFF2-40B4-BE49-F238E27FC236}">
+                <a16:creationId xmlns:a16="http://schemas.microsoft.com/office/drawing/2014/main" id="{4A9B2360-F4D9-AE4C-9EEC-A4CFBA2033D3}"/>
+              </a:ext>
+            </a:extLst>
+          </p:cNvPr>
+          <p:cNvSpPr>
+            <a:spLocks noGrp="1"/>
+          </p:cNvSpPr>
+          <p:nvPr>
+            <p:ph type="ftr" sz="quarter" idx="11"/>
+          </p:nvPr>
+        </p:nvSpPr>
+        <p:spPr/>
+        <p:txBody>
+          <a:bodyPr/>
+          <a:lstStyle/>
+          <a:p>
+            <a:r>
+              <a:rPr lang="en-GB"/>
+              <a:t>Stefano Weidmann</a:t>
+            </a:r>
+            <a:endParaRPr lang="en-GB" dirty="0"/>
+          </a:p>
+        </p:txBody>
+      </p:sp>
+      <p:sp>
+        <p:nvSpPr>
+          <p:cNvPr id="5" name="Foliennummernplatzhalter 4">
+            <a:extLst>
+              <a:ext uri="{FF2B5EF4-FFF2-40B4-BE49-F238E27FC236}">
+                <a16:creationId xmlns:a16="http://schemas.microsoft.com/office/drawing/2014/main" id="{1A492E0F-5C26-BB4B-B069-FD5C51B9601C}"/>
+              </a:ext>
+            </a:extLst>
+          </p:cNvPr>
+          <p:cNvSpPr>
+            <a:spLocks noGrp="1"/>
+          </p:cNvSpPr>
+          <p:nvPr>
+            <p:ph type="sldNum" sz="quarter" idx="12"/>
+          </p:nvPr>
+        </p:nvSpPr>
+        <p:spPr/>
+        <p:txBody>
+          <a:bodyPr/>
+          <a:lstStyle/>
+          <a:p>
+            <a:fld id="{6C6AE60A-B69C-4790-82F7-3882EDF23186}" type="slidenum">
+              <a:rPr lang="en-GB" smtClean="0"/>
+              <a:t>15</a:t>
+            </a:fld>
+            <a:endParaRPr lang="en-GB" dirty="0"/>
+          </a:p>
+        </p:txBody>
+      </p:sp>
+      <p:sp>
+        <p:nvSpPr>
+          <p:cNvPr id="6" name="Titel 5">
+            <a:extLst>
+              <a:ext uri="{FF2B5EF4-FFF2-40B4-BE49-F238E27FC236}">
+                <a16:creationId xmlns:a16="http://schemas.microsoft.com/office/drawing/2014/main" id="{093E6871-1294-6A46-B292-075EEB8628C0}"/>
+              </a:ext>
+            </a:extLst>
+          </p:cNvPr>
+          <p:cNvSpPr>
+            <a:spLocks noGrp="1"/>
+          </p:cNvSpPr>
+          <p:nvPr>
+            <p:ph type="title"/>
+          </p:nvPr>
+        </p:nvSpPr>
+        <p:spPr/>
+        <p:txBody>
+          <a:bodyPr/>
+          <a:lstStyle/>
+          <a:p>
+            <a:r>
+              <a:rPr lang="en-US" dirty="0"/>
+              <a:t>Adjoint</a:t>
+            </a:r>
+          </a:p>
+        </p:txBody>
+      </p:sp>
+      <p:sp>
+        <p:nvSpPr>
+          <p:cNvPr id="14" name="Textfeld 13">
+            <a:extLst>
+              <a:ext uri="{FF2B5EF4-FFF2-40B4-BE49-F238E27FC236}">
+                <a16:creationId xmlns:a16="http://schemas.microsoft.com/office/drawing/2014/main" id="{E2BEB42B-D84C-8947-9B2D-FA203D214763}"/>
+              </a:ext>
+            </a:extLst>
+          </p:cNvPr>
+          <p:cNvSpPr txBox="1"/>
+          <p:nvPr/>
+        </p:nvSpPr>
+        <p:spPr>
+          <a:xfrm>
+            <a:off x="1277467" y="6276460"/>
+            <a:ext cx="10284522" cy="276999"/>
+          </a:xfrm>
+          <a:prstGeom prst="rect">
+            <a:avLst/>
+          </a:prstGeom>
+          <a:noFill/>
+        </p:spPr>
+        <p:txBody>
+          <a:bodyPr wrap="square" rtlCol="0">
+            <a:spAutoFit/>
+          </a:bodyPr>
+          <a:lstStyle/>
+          <a:p>
+            <a:r>
+              <a:rPr lang="en-US" sz="1200" dirty="0">
+                <a:solidFill>
+                  <a:schemeClr val="bg2">
+                    <a:lumMod val="50000"/>
+                  </a:schemeClr>
+                </a:solidFill>
+              </a:rPr>
+              <a:t>Linear system of equation included from main paper (see title slide)</a:t>
+            </a:r>
+          </a:p>
+        </p:txBody>
+      </p:sp>
+      <p:pic>
+        <p:nvPicPr>
+          <p:cNvPr id="9" name="Grafik 8">
+            <a:extLst>
+              <a:ext uri="{FF2B5EF4-FFF2-40B4-BE49-F238E27FC236}">
+                <a16:creationId xmlns:a16="http://schemas.microsoft.com/office/drawing/2014/main" id="{BB2DA093-8657-A346-8F13-2187FEE747A2}"/>
+              </a:ext>
+            </a:extLst>
+          </p:cNvPr>
+          <p:cNvPicPr>
+            <a:picLocks noChangeAspect="1"/>
+          </p:cNvPicPr>
+          <p:nvPr/>
+        </p:nvPicPr>
+        <p:blipFill>
+          <a:blip r:embed="rId2">
+            <a:extLst>
+              <a:ext uri="{28A0092B-C50C-407E-A947-70E740481C1C}">
+                <a14:useLocalDpi xmlns:a14="http://schemas.microsoft.com/office/drawing/2010/main" val="0"/>
+              </a:ext>
+            </a:extLst>
+          </a:blip>
+          <a:stretch>
+            <a:fillRect/>
+          </a:stretch>
+        </p:blipFill>
+        <p:spPr>
+          <a:xfrm>
+            <a:off x="764590" y="1215883"/>
+            <a:ext cx="5630338" cy="2717172"/>
+          </a:xfrm>
+          <a:prstGeom prst="rect">
+            <a:avLst/>
+          </a:prstGeom>
+        </p:spPr>
+      </p:pic>
+      <p:pic>
+        <p:nvPicPr>
+          <p:cNvPr id="7" name="Grafik 6">
+            <a:extLst>
+              <a:ext uri="{FF2B5EF4-FFF2-40B4-BE49-F238E27FC236}">
+                <a16:creationId xmlns:a16="http://schemas.microsoft.com/office/drawing/2014/main" id="{FBC36F5E-F91C-9A40-822F-FB469053AFB1}"/>
+              </a:ext>
+            </a:extLst>
+          </p:cNvPr>
+          <p:cNvPicPr>
+            <a:picLocks noChangeAspect="1"/>
+          </p:cNvPicPr>
+          <p:nvPr/>
+        </p:nvPicPr>
+        <p:blipFill>
+          <a:blip r:embed="rId3"/>
+          <a:stretch>
+            <a:fillRect/>
+          </a:stretch>
+        </p:blipFill>
+        <p:spPr>
+          <a:xfrm>
+            <a:off x="764588" y="4572302"/>
+            <a:ext cx="7197935" cy="728905"/>
+          </a:xfrm>
+          <a:prstGeom prst="rect">
+            <a:avLst/>
+          </a:prstGeom>
+        </p:spPr>
+      </p:pic>
+      <p:pic>
+        <p:nvPicPr>
+          <p:cNvPr id="10" name="Grafik 9">
+            <a:extLst>
+              <a:ext uri="{FF2B5EF4-FFF2-40B4-BE49-F238E27FC236}">
+                <a16:creationId xmlns:a16="http://schemas.microsoft.com/office/drawing/2014/main" id="{F8ABCBDB-224B-BE42-902A-8D820BAAC8A1}"/>
+              </a:ext>
+            </a:extLst>
+          </p:cNvPr>
+          <p:cNvPicPr>
+            <a:picLocks noChangeAspect="1"/>
+          </p:cNvPicPr>
+          <p:nvPr/>
+        </p:nvPicPr>
+        <p:blipFill>
+          <a:blip r:embed="rId4"/>
+          <a:stretch>
+            <a:fillRect/>
+          </a:stretch>
+        </p:blipFill>
+        <p:spPr>
+          <a:xfrm>
+            <a:off x="6904125" y="1635625"/>
+            <a:ext cx="4749800" cy="1104900"/>
+          </a:xfrm>
+          <a:prstGeom prst="rect">
+            <a:avLst/>
+          </a:prstGeom>
+        </p:spPr>
+      </p:pic>
+    </p:spTree>
+    <p:extLst>
+      <p:ext uri="{BB962C8B-B14F-4D97-AF65-F5344CB8AC3E}">
+        <p14:creationId xmlns:p14="http://schemas.microsoft.com/office/powerpoint/2010/main" val="3679112641"/>
+      </p:ext>
+    </p:extLst>
+  </p:cSld>
+  <p:clrMapOvr>
+    <a:masterClrMapping/>
+  </p:clrMapOvr>
+  <p:transition>
+    <p:fade/>
+  </p:transition>
+</p:sld>
+</file>
+
+<file path=ppt/slides/slide16.xml><?xml version="1.0" encoding="utf-8"?>
+<p:sld xmlns:a="http://schemas.openxmlformats.org/drawingml/2006/main" xmlns:r="http://schemas.openxmlformats.org/officeDocument/2006/relationships" xmlns:p="http://schemas.openxmlformats.org/presentationml/2006/main">
+  <p:cSld>
+    <p:spTree>
+      <p:nvGrpSpPr>
+        <p:cNvPr id="1" name=""/>
+        <p:cNvGrpSpPr/>
+        <p:nvPr/>
+      </p:nvGrpSpPr>
+      <p:grpSpPr>
+        <a:xfrm>
+          <a:off x="0" y="0"/>
+          <a:ext cx="0" cy="0"/>
+          <a:chOff x="0" y="0"/>
+          <a:chExt cx="0" cy="0"/>
+        </a:xfrm>
+      </p:grpSpPr>
+      <p:sp>
+        <p:nvSpPr>
+          <p:cNvPr id="3" name="Datumsplatzhalter 2">
+            <a:extLst>
+              <a:ext uri="{FF2B5EF4-FFF2-40B4-BE49-F238E27FC236}">
+                <a16:creationId xmlns:a16="http://schemas.microsoft.com/office/drawing/2014/main" id="{BE5D950A-3B8C-1949-88F5-9F1443665B35}"/>
+              </a:ext>
+            </a:extLst>
+          </p:cNvPr>
+          <p:cNvSpPr>
+            <a:spLocks noGrp="1"/>
+          </p:cNvSpPr>
+          <p:nvPr>
+            <p:ph type="dt" sz="half" idx="10"/>
+          </p:nvPr>
+        </p:nvSpPr>
+        <p:spPr/>
+        <p:txBody>
+          <a:bodyPr/>
+          <a:lstStyle/>
+          <a:p>
+            <a:fld id="{CA19FB8E-A97D-E34E-9EA9-C874AD42758F}" type="datetime1">
+              <a:rPr lang="de-CH" smtClean="0"/>
+              <a:t>23.05.18</a:t>
+            </a:fld>
+            <a:endParaRPr lang="en-GB" dirty="0"/>
+          </a:p>
+        </p:txBody>
+      </p:sp>
+      <p:sp>
+        <p:nvSpPr>
+          <p:cNvPr id="4" name="Fußzeilenplatzhalter 3">
+            <a:extLst>
+              <a:ext uri="{FF2B5EF4-FFF2-40B4-BE49-F238E27FC236}">
+                <a16:creationId xmlns:a16="http://schemas.microsoft.com/office/drawing/2014/main" id="{B1C7C8A9-196E-164E-A60B-ECB635D6F7A5}"/>
+              </a:ext>
+            </a:extLst>
+          </p:cNvPr>
+          <p:cNvSpPr>
+            <a:spLocks noGrp="1"/>
+          </p:cNvSpPr>
+          <p:nvPr>
+            <p:ph type="ftr" sz="quarter" idx="11"/>
+          </p:nvPr>
+        </p:nvSpPr>
+        <p:spPr/>
+        <p:txBody>
+          <a:bodyPr/>
+          <a:lstStyle/>
+          <a:p>
+            <a:r>
+              <a:rPr lang="en-GB"/>
+              <a:t>Stefano Weidmann</a:t>
+            </a:r>
+            <a:endParaRPr lang="en-GB" dirty="0"/>
+          </a:p>
+        </p:txBody>
+      </p:sp>
+      <p:sp>
+        <p:nvSpPr>
+          <p:cNvPr id="5" name="Foliennummernplatzhalter 4">
+            <a:extLst>
+              <a:ext uri="{FF2B5EF4-FFF2-40B4-BE49-F238E27FC236}">
+                <a16:creationId xmlns:a16="http://schemas.microsoft.com/office/drawing/2014/main" id="{45AD10A3-A527-A145-8A66-266B1F940463}"/>
+              </a:ext>
+            </a:extLst>
+          </p:cNvPr>
+          <p:cNvSpPr>
+            <a:spLocks noGrp="1"/>
+          </p:cNvSpPr>
+          <p:nvPr>
+            <p:ph type="sldNum" sz="quarter" idx="12"/>
+          </p:nvPr>
+        </p:nvSpPr>
+        <p:spPr/>
+        <p:txBody>
+          <a:bodyPr/>
+          <a:lstStyle/>
+          <a:p>
+            <a:fld id="{6C6AE60A-B69C-4790-82F7-3882EDF23186}" type="slidenum">
+              <a:rPr lang="en-GB" smtClean="0"/>
+              <a:t>16</a:t>
+            </a:fld>
+            <a:endParaRPr lang="en-GB" dirty="0"/>
+          </a:p>
+        </p:txBody>
+      </p:sp>
+      <p:sp>
+        <p:nvSpPr>
+          <p:cNvPr id="6" name="Titel 5">
+            <a:extLst>
+              <a:ext uri="{FF2B5EF4-FFF2-40B4-BE49-F238E27FC236}">
+                <a16:creationId xmlns:a16="http://schemas.microsoft.com/office/drawing/2014/main" id="{6A082C51-D8D8-504E-9B56-9BDEA8D12E2E}"/>
+              </a:ext>
+            </a:extLst>
+          </p:cNvPr>
+          <p:cNvSpPr>
+            <a:spLocks noGrp="1"/>
+          </p:cNvSpPr>
+          <p:nvPr>
+            <p:ph type="title"/>
+          </p:nvPr>
+        </p:nvSpPr>
+        <p:spPr/>
+        <p:txBody>
+          <a:bodyPr/>
+          <a:lstStyle/>
+          <a:p>
+            <a:r>
+              <a:rPr lang="en-US" dirty="0"/>
+              <a:t>Monte Carlo</a:t>
+            </a:r>
+          </a:p>
+        </p:txBody>
+      </p:sp>
+      <p:pic>
+        <p:nvPicPr>
+          <p:cNvPr id="10" name="Grafik 9">
+            <a:extLst>
+              <a:ext uri="{FF2B5EF4-FFF2-40B4-BE49-F238E27FC236}">
+                <a16:creationId xmlns:a16="http://schemas.microsoft.com/office/drawing/2014/main" id="{991D0244-5324-E947-8A63-06DBCF896F82}"/>
+              </a:ext>
+            </a:extLst>
+          </p:cNvPr>
+          <p:cNvPicPr>
+            <a:picLocks noChangeAspect="1"/>
+          </p:cNvPicPr>
+          <p:nvPr/>
+        </p:nvPicPr>
+        <p:blipFill>
+          <a:blip r:embed="rId2">
+            <a:extLst>
+              <a:ext uri="{28A0092B-C50C-407E-A947-70E740481C1C}">
+                <a14:useLocalDpi xmlns:a14="http://schemas.microsoft.com/office/drawing/2010/main" val="0"/>
+              </a:ext>
+              <a:ext uri="{96DAC541-7B7A-43D3-8B79-37D633B846F1}">
+                <asvg:svgBlip xmlns:asvg="http://schemas.microsoft.com/office/drawing/2016/SVG/main" r:embed="rId3"/>
+              </a:ext>
+            </a:extLst>
+          </a:blip>
+          <a:stretch>
+            <a:fillRect/>
+          </a:stretch>
+        </p:blipFill>
+        <p:spPr>
+          <a:xfrm>
+            <a:off x="4459543" y="2694266"/>
+            <a:ext cx="3113721" cy="3337461"/>
+          </a:xfrm>
+          <a:prstGeom prst="rect">
+            <a:avLst/>
+          </a:prstGeom>
+        </p:spPr>
+      </p:pic>
+      <p:sp>
+        <p:nvSpPr>
+          <p:cNvPr id="11" name="Textfeld 10">
+            <a:extLst>
+              <a:ext uri="{FF2B5EF4-FFF2-40B4-BE49-F238E27FC236}">
+                <a16:creationId xmlns:a16="http://schemas.microsoft.com/office/drawing/2014/main" id="{56CB730B-2A3E-D247-B9CE-3EBE72DBFD89}"/>
+              </a:ext>
+            </a:extLst>
+          </p:cNvPr>
+          <p:cNvSpPr txBox="1"/>
+          <p:nvPr/>
+        </p:nvSpPr>
+        <p:spPr>
+          <a:xfrm>
+            <a:off x="1125067" y="6124060"/>
+            <a:ext cx="10284522" cy="276999"/>
+          </a:xfrm>
+          <a:prstGeom prst="rect">
+            <a:avLst/>
+          </a:prstGeom>
+          <a:noFill/>
+        </p:spPr>
+        <p:txBody>
+          <a:bodyPr wrap="square" rtlCol="0">
+            <a:spAutoFit/>
+          </a:bodyPr>
+          <a:lstStyle/>
+          <a:p>
+            <a:r>
+              <a:rPr lang="en-US" sz="1200" dirty="0">
+                <a:solidFill>
+                  <a:schemeClr val="bg2">
+                    <a:lumMod val="50000"/>
+                  </a:schemeClr>
+                </a:solidFill>
+              </a:rPr>
+              <a:t>Image in public domain: https://</a:t>
+            </a:r>
+            <a:r>
+              <a:rPr lang="en-US" sz="1200" dirty="0" err="1">
+                <a:solidFill>
+                  <a:schemeClr val="bg2">
+                    <a:lumMod val="50000"/>
+                  </a:schemeClr>
+                </a:solidFill>
+              </a:rPr>
+              <a:t>commons.wikimedia.org</a:t>
+            </a:r>
+            <a:r>
+              <a:rPr lang="en-US" sz="1200" dirty="0">
+                <a:solidFill>
+                  <a:schemeClr val="bg2">
+                    <a:lumMod val="50000"/>
+                  </a:schemeClr>
+                </a:solidFill>
+              </a:rPr>
+              <a:t>/wiki/</a:t>
+            </a:r>
+            <a:r>
+              <a:rPr lang="en-US" sz="1200" dirty="0" err="1">
+                <a:solidFill>
+                  <a:schemeClr val="bg2">
+                    <a:lumMod val="50000"/>
+                  </a:schemeClr>
+                </a:solidFill>
+              </a:rPr>
+              <a:t>File:Gradient_descent.svg</a:t>
+            </a:r>
+            <a:endParaRPr lang="en-US" sz="1200" dirty="0">
+              <a:solidFill>
+                <a:schemeClr val="bg2">
+                  <a:lumMod val="50000"/>
+                </a:schemeClr>
+              </a:solidFill>
+            </a:endParaRPr>
+          </a:p>
+        </p:txBody>
+      </p:sp>
+      <p:pic>
+        <p:nvPicPr>
+          <p:cNvPr id="13" name="Grafik 12">
+            <a:extLst>
+              <a:ext uri="{FF2B5EF4-FFF2-40B4-BE49-F238E27FC236}">
+                <a16:creationId xmlns:a16="http://schemas.microsoft.com/office/drawing/2014/main" id="{50D8EB2D-C184-ED4C-9C72-B8AEF7B4436F}"/>
+              </a:ext>
+            </a:extLst>
+          </p:cNvPr>
+          <p:cNvPicPr>
+            <a:picLocks noChangeAspect="1"/>
+          </p:cNvPicPr>
+          <p:nvPr/>
+        </p:nvPicPr>
+        <p:blipFill>
+          <a:blip r:embed="rId4"/>
+          <a:stretch>
+            <a:fillRect/>
+          </a:stretch>
+        </p:blipFill>
+        <p:spPr>
+          <a:xfrm>
+            <a:off x="547359" y="1287910"/>
+            <a:ext cx="11409589" cy="1326960"/>
+          </a:xfrm>
+          <a:prstGeom prst="rect">
+            <a:avLst/>
+          </a:prstGeom>
+        </p:spPr>
+      </p:pic>
+    </p:spTree>
+    <p:extLst>
+      <p:ext uri="{BB962C8B-B14F-4D97-AF65-F5344CB8AC3E}">
+        <p14:creationId xmlns:p14="http://schemas.microsoft.com/office/powerpoint/2010/main" val="735839640"/>
+      </p:ext>
+    </p:extLst>
+  </p:cSld>
+  <p:clrMapOvr>
+    <a:masterClrMapping/>
+  </p:clrMapOvr>
+  <p:transition>
+    <p:fade/>
+  </p:transition>
+</p:sld>
+</file>
+
+<file path=ppt/slides/slide17.xml><?xml version="1.0" encoding="utf-8"?>
+<p:sld xmlns:a="http://schemas.openxmlformats.org/drawingml/2006/main" xmlns:r="http://schemas.openxmlformats.org/officeDocument/2006/relationships" xmlns:p="http://schemas.openxmlformats.org/presentationml/2006/main">
+  <p:cSld>
+    <p:spTree>
+      <p:nvGrpSpPr>
+        <p:cNvPr id="1" name=""/>
+        <p:cNvGrpSpPr/>
+        <p:nvPr/>
+      </p:nvGrpSpPr>
+      <p:grpSpPr>
+        <a:xfrm>
+          <a:off x="0" y="0"/>
+          <a:ext cx="0" cy="0"/>
+          <a:chOff x="0" y="0"/>
+          <a:chExt cx="0" cy="0"/>
+        </a:xfrm>
+      </p:grpSpPr>
+      <p:sp>
+        <p:nvSpPr>
+          <p:cNvPr id="3" name="Datumsplatzhalter 2">
+            <a:extLst>
+              <a:ext uri="{FF2B5EF4-FFF2-40B4-BE49-F238E27FC236}">
+                <a16:creationId xmlns:a16="http://schemas.microsoft.com/office/drawing/2014/main" id="{8AA01591-415C-D241-9F8C-7B8C71232B20}"/>
+              </a:ext>
+            </a:extLst>
+          </p:cNvPr>
+          <p:cNvSpPr>
+            <a:spLocks noGrp="1"/>
+          </p:cNvSpPr>
+          <p:nvPr>
+            <p:ph type="dt" sz="half" idx="10"/>
+          </p:nvPr>
+        </p:nvSpPr>
+        <p:spPr/>
+        <p:txBody>
+          <a:bodyPr/>
+          <a:lstStyle/>
+          <a:p>
+            <a:fld id="{CA19FB8E-A97D-E34E-9EA9-C874AD42758F}" type="datetime1">
+              <a:rPr lang="de-CH" smtClean="0"/>
+              <a:t>23.05.18</a:t>
+            </a:fld>
+            <a:endParaRPr lang="en-GB" dirty="0"/>
+          </a:p>
+        </p:txBody>
+      </p:sp>
+      <p:sp>
+        <p:nvSpPr>
+          <p:cNvPr id="4" name="Fußzeilenplatzhalter 3">
+            <a:extLst>
+              <a:ext uri="{FF2B5EF4-FFF2-40B4-BE49-F238E27FC236}">
+                <a16:creationId xmlns:a16="http://schemas.microsoft.com/office/drawing/2014/main" id="{741CC962-D70E-344F-91A5-CB992F9F9F7E}"/>
+              </a:ext>
+            </a:extLst>
+          </p:cNvPr>
+          <p:cNvSpPr>
+            <a:spLocks noGrp="1"/>
+          </p:cNvSpPr>
+          <p:nvPr>
+            <p:ph type="ftr" sz="quarter" idx="11"/>
+          </p:nvPr>
+        </p:nvSpPr>
+        <p:spPr/>
+        <p:txBody>
+          <a:bodyPr/>
+          <a:lstStyle/>
+          <a:p>
+            <a:r>
+              <a:rPr lang="en-GB"/>
+              <a:t>Stefano Weidmann</a:t>
+            </a:r>
+            <a:endParaRPr lang="en-GB" dirty="0"/>
+          </a:p>
+        </p:txBody>
+      </p:sp>
+      <p:sp>
+        <p:nvSpPr>
+          <p:cNvPr id="5" name="Foliennummernplatzhalter 4">
+            <a:extLst>
+              <a:ext uri="{FF2B5EF4-FFF2-40B4-BE49-F238E27FC236}">
+                <a16:creationId xmlns:a16="http://schemas.microsoft.com/office/drawing/2014/main" id="{80458006-354C-5945-BD15-3C7E50B5D6B9}"/>
+              </a:ext>
+            </a:extLst>
+          </p:cNvPr>
+          <p:cNvSpPr>
+            <a:spLocks noGrp="1"/>
+          </p:cNvSpPr>
+          <p:nvPr>
+            <p:ph type="sldNum" sz="quarter" idx="12"/>
+          </p:nvPr>
+        </p:nvSpPr>
+        <p:spPr/>
+        <p:txBody>
+          <a:bodyPr/>
+          <a:lstStyle/>
+          <a:p>
+            <a:fld id="{6C6AE60A-B69C-4790-82F7-3882EDF23186}" type="slidenum">
+              <a:rPr lang="en-GB" smtClean="0"/>
+              <a:t>17</a:t>
+            </a:fld>
+            <a:endParaRPr lang="en-GB" dirty="0"/>
+          </a:p>
+        </p:txBody>
+      </p:sp>
+      <p:sp>
+        <p:nvSpPr>
+          <p:cNvPr id="6" name="Titel 5">
+            <a:extLst>
+              <a:ext uri="{FF2B5EF4-FFF2-40B4-BE49-F238E27FC236}">
+                <a16:creationId xmlns:a16="http://schemas.microsoft.com/office/drawing/2014/main" id="{D2AC6E09-6C23-614C-849B-B7F6F6F928F0}"/>
+              </a:ext>
+            </a:extLst>
+          </p:cNvPr>
+          <p:cNvSpPr>
+            <a:spLocks noGrp="1"/>
+          </p:cNvSpPr>
+          <p:nvPr>
+            <p:ph type="title"/>
+          </p:nvPr>
+        </p:nvSpPr>
+        <p:spPr>
+          <a:xfrm>
+            <a:off x="323850" y="642944"/>
+            <a:ext cx="11537950" cy="972000"/>
+          </a:xfrm>
+        </p:spPr>
+        <p:txBody>
+          <a:bodyPr/>
+          <a:lstStyle/>
+          <a:p>
+            <a:r>
+              <a:rPr lang="en-US" dirty="0"/>
+              <a:t>Monte Carlo</a:t>
+            </a:r>
+          </a:p>
+        </p:txBody>
+      </p:sp>
+      <p:pic>
+        <p:nvPicPr>
+          <p:cNvPr id="8" name="Grafik 7">
+            <a:extLst>
+              <a:ext uri="{FF2B5EF4-FFF2-40B4-BE49-F238E27FC236}">
+                <a16:creationId xmlns:a16="http://schemas.microsoft.com/office/drawing/2014/main" id="{583FBCAE-A05A-EA42-B617-142E7611AB3A}"/>
+              </a:ext>
+            </a:extLst>
+          </p:cNvPr>
+          <p:cNvPicPr>
+            <a:picLocks noChangeAspect="1"/>
+          </p:cNvPicPr>
+          <p:nvPr/>
+        </p:nvPicPr>
+        <p:blipFill>
+          <a:blip r:embed="rId2">
+            <a:extLst>
+              <a:ext uri="{28A0092B-C50C-407E-A947-70E740481C1C}">
+                <a14:useLocalDpi xmlns:a14="http://schemas.microsoft.com/office/drawing/2010/main" val="0"/>
+              </a:ext>
+            </a:extLst>
+          </a:blip>
+          <a:stretch>
+            <a:fillRect/>
+          </a:stretch>
+        </p:blipFill>
+        <p:spPr>
+          <a:xfrm>
+            <a:off x="909043" y="1128944"/>
+            <a:ext cx="7886100" cy="3168026"/>
+          </a:xfrm>
+          <a:prstGeom prst="rect">
+            <a:avLst/>
+          </a:prstGeom>
+        </p:spPr>
+      </p:pic>
+      <p:sp>
+        <p:nvSpPr>
+          <p:cNvPr id="10" name="Textfeld 9">
+            <a:extLst>
+              <a:ext uri="{FF2B5EF4-FFF2-40B4-BE49-F238E27FC236}">
+                <a16:creationId xmlns:a16="http://schemas.microsoft.com/office/drawing/2014/main" id="{88535001-97A9-484E-9276-60E6FD7A82AB}"/>
+              </a:ext>
+            </a:extLst>
+          </p:cNvPr>
+          <p:cNvSpPr txBox="1"/>
+          <p:nvPr/>
+        </p:nvSpPr>
+        <p:spPr>
+          <a:xfrm>
+            <a:off x="1125067" y="6124060"/>
+            <a:ext cx="10284522" cy="276999"/>
+          </a:xfrm>
+          <a:prstGeom prst="rect">
+            <a:avLst/>
+          </a:prstGeom>
+          <a:noFill/>
+        </p:spPr>
+        <p:txBody>
+          <a:bodyPr wrap="square" rtlCol="0">
+            <a:spAutoFit/>
+          </a:bodyPr>
+          <a:lstStyle/>
+          <a:p>
+            <a:r>
+              <a:rPr lang="en-US" sz="1200" dirty="0">
+                <a:solidFill>
+                  <a:schemeClr val="bg2">
+                    <a:lumMod val="50000"/>
+                  </a:schemeClr>
+                </a:solidFill>
+              </a:rPr>
+              <a:t>Formulas from the main paper (see title slide)</a:t>
+            </a:r>
+          </a:p>
+        </p:txBody>
+      </p:sp>
+      <p:pic>
+        <p:nvPicPr>
+          <p:cNvPr id="12" name="Grafik 11">
+            <a:extLst>
+              <a:ext uri="{FF2B5EF4-FFF2-40B4-BE49-F238E27FC236}">
+                <a16:creationId xmlns:a16="http://schemas.microsoft.com/office/drawing/2014/main" id="{C6AD0DDD-26D9-AD47-82C8-4A487C77974F}"/>
+              </a:ext>
+            </a:extLst>
+          </p:cNvPr>
+          <p:cNvPicPr>
+            <a:picLocks noChangeAspect="1"/>
+          </p:cNvPicPr>
+          <p:nvPr/>
+        </p:nvPicPr>
+        <p:blipFill>
+          <a:blip r:embed="rId3">
+            <a:extLst>
+              <a:ext uri="{28A0092B-C50C-407E-A947-70E740481C1C}">
+                <a14:useLocalDpi xmlns:a14="http://schemas.microsoft.com/office/drawing/2010/main" val="0"/>
+              </a:ext>
+            </a:extLst>
+          </a:blip>
+          <a:stretch>
+            <a:fillRect/>
+          </a:stretch>
+        </p:blipFill>
+        <p:spPr>
+          <a:xfrm>
+            <a:off x="9211797" y="1340767"/>
+            <a:ext cx="1515642" cy="2736305"/>
+          </a:xfrm>
+          <a:prstGeom prst="rect">
+            <a:avLst/>
+          </a:prstGeom>
+        </p:spPr>
+      </p:pic>
+    </p:spTree>
+    <p:extLst>
+      <p:ext uri="{BB962C8B-B14F-4D97-AF65-F5344CB8AC3E}">
+        <p14:creationId xmlns:p14="http://schemas.microsoft.com/office/powerpoint/2010/main" val="343987873"/>
+      </p:ext>
+    </p:extLst>
+  </p:cSld>
+  <p:clrMapOvr>
+    <a:masterClrMapping/>
+  </p:clrMapOvr>
+  <p:transition>
+    <p:fade/>
+  </p:transition>
+</p:sld>
+</file>
+
+<file path=ppt/slides/slide18.xml><?xml version="1.0" encoding="utf-8"?>
+<p:sld xmlns:a="http://schemas.openxmlformats.org/drawingml/2006/main" xmlns:r="http://schemas.openxmlformats.org/officeDocument/2006/relationships" xmlns:p="http://schemas.openxmlformats.org/presentationml/2006/main">
+  <p:cSld>
+    <p:spTree>
+      <p:nvGrpSpPr>
+        <p:cNvPr id="1" name=""/>
+        <p:cNvGrpSpPr/>
+        <p:nvPr/>
+      </p:nvGrpSpPr>
+      <p:grpSpPr>
+        <a:xfrm>
+          <a:off x="0" y="0"/>
+          <a:ext cx="0" cy="0"/>
+          <a:chOff x="0" y="0"/>
+          <a:chExt cx="0" cy="0"/>
+        </a:xfrm>
+      </p:grpSpPr>
+      <p:sp>
+        <p:nvSpPr>
+          <p:cNvPr id="3" name="Datumsplatzhalter 2">
+            <a:extLst>
+              <a:ext uri="{FF2B5EF4-FFF2-40B4-BE49-F238E27FC236}">
+                <a16:creationId xmlns:a16="http://schemas.microsoft.com/office/drawing/2014/main" id="{8AA01591-415C-D241-9F8C-7B8C71232B20}"/>
+              </a:ext>
+            </a:extLst>
+          </p:cNvPr>
+          <p:cNvSpPr>
+            <a:spLocks noGrp="1"/>
+          </p:cNvSpPr>
+          <p:nvPr>
+            <p:ph type="dt" sz="half" idx="10"/>
+          </p:nvPr>
+        </p:nvSpPr>
+        <p:spPr/>
+        <p:txBody>
+          <a:bodyPr/>
+          <a:lstStyle/>
+          <a:p>
+            <a:fld id="{CA19FB8E-A97D-E34E-9EA9-C874AD42758F}" type="datetime1">
+              <a:rPr lang="de-CH" smtClean="0"/>
+              <a:t>23.05.18</a:t>
+            </a:fld>
+            <a:endParaRPr lang="en-GB" dirty="0"/>
+          </a:p>
+        </p:txBody>
+      </p:sp>
+      <p:sp>
+        <p:nvSpPr>
+          <p:cNvPr id="4" name="Fußzeilenplatzhalter 3">
+            <a:extLst>
+              <a:ext uri="{FF2B5EF4-FFF2-40B4-BE49-F238E27FC236}">
+                <a16:creationId xmlns:a16="http://schemas.microsoft.com/office/drawing/2014/main" id="{741CC962-D70E-344F-91A5-CB992F9F9F7E}"/>
+              </a:ext>
+            </a:extLst>
+          </p:cNvPr>
+          <p:cNvSpPr>
+            <a:spLocks noGrp="1"/>
+          </p:cNvSpPr>
+          <p:nvPr>
+            <p:ph type="ftr" sz="quarter" idx="11"/>
+          </p:nvPr>
+        </p:nvSpPr>
+        <p:spPr/>
+        <p:txBody>
+          <a:bodyPr/>
+          <a:lstStyle/>
+          <a:p>
+            <a:r>
+              <a:rPr lang="en-GB"/>
+              <a:t>Stefano Weidmann</a:t>
+            </a:r>
+            <a:endParaRPr lang="en-GB" dirty="0"/>
+          </a:p>
+        </p:txBody>
+      </p:sp>
+      <p:sp>
+        <p:nvSpPr>
+          <p:cNvPr id="5" name="Foliennummernplatzhalter 4">
+            <a:extLst>
+              <a:ext uri="{FF2B5EF4-FFF2-40B4-BE49-F238E27FC236}">
+                <a16:creationId xmlns:a16="http://schemas.microsoft.com/office/drawing/2014/main" id="{80458006-354C-5945-BD15-3C7E50B5D6B9}"/>
+              </a:ext>
+            </a:extLst>
+          </p:cNvPr>
+          <p:cNvSpPr>
+            <a:spLocks noGrp="1"/>
+          </p:cNvSpPr>
+          <p:nvPr>
+            <p:ph type="sldNum" sz="quarter" idx="12"/>
+          </p:nvPr>
+        </p:nvSpPr>
+        <p:spPr/>
+        <p:txBody>
+          <a:bodyPr/>
+          <a:lstStyle/>
+          <a:p>
+            <a:fld id="{6C6AE60A-B69C-4790-82F7-3882EDF23186}" type="slidenum">
+              <a:rPr lang="en-GB" smtClean="0"/>
+              <a:t>18</a:t>
+            </a:fld>
+            <a:endParaRPr lang="en-GB" dirty="0"/>
+          </a:p>
+        </p:txBody>
+      </p:sp>
+      <p:sp>
+        <p:nvSpPr>
+          <p:cNvPr id="6" name="Titel 5">
+            <a:extLst>
+              <a:ext uri="{FF2B5EF4-FFF2-40B4-BE49-F238E27FC236}">
+                <a16:creationId xmlns:a16="http://schemas.microsoft.com/office/drawing/2014/main" id="{D2AC6E09-6C23-614C-849B-B7F6F6F928F0}"/>
+              </a:ext>
+            </a:extLst>
+          </p:cNvPr>
+          <p:cNvSpPr>
+            <a:spLocks noGrp="1"/>
+          </p:cNvSpPr>
+          <p:nvPr>
+            <p:ph type="title"/>
+          </p:nvPr>
+        </p:nvSpPr>
+        <p:spPr>
+          <a:xfrm>
+            <a:off x="323850" y="642944"/>
+            <a:ext cx="11537950" cy="972000"/>
+          </a:xfrm>
+        </p:spPr>
+        <p:txBody>
+          <a:bodyPr/>
+          <a:lstStyle/>
+          <a:p>
+            <a:r>
+              <a:rPr lang="en-US" dirty="0"/>
+              <a:t>Monte Carlo</a:t>
+            </a:r>
+          </a:p>
+        </p:txBody>
+      </p:sp>
+      <p:pic>
+        <p:nvPicPr>
+          <p:cNvPr id="8" name="Grafik 7">
+            <a:extLst>
+              <a:ext uri="{FF2B5EF4-FFF2-40B4-BE49-F238E27FC236}">
+                <a16:creationId xmlns:a16="http://schemas.microsoft.com/office/drawing/2014/main" id="{583FBCAE-A05A-EA42-B617-142E7611AB3A}"/>
+              </a:ext>
+            </a:extLst>
+          </p:cNvPr>
+          <p:cNvPicPr>
+            <a:picLocks noChangeAspect="1"/>
+          </p:cNvPicPr>
+          <p:nvPr/>
+        </p:nvPicPr>
+        <p:blipFill>
+          <a:blip r:embed="rId2">
+            <a:extLst>
+              <a:ext uri="{28A0092B-C50C-407E-A947-70E740481C1C}">
+                <a14:useLocalDpi xmlns:a14="http://schemas.microsoft.com/office/drawing/2010/main" val="0"/>
+              </a:ext>
+            </a:extLst>
+          </a:blip>
+          <a:stretch>
+            <a:fillRect/>
+          </a:stretch>
+        </p:blipFill>
+        <p:spPr>
+          <a:xfrm>
+            <a:off x="909043" y="1128944"/>
+            <a:ext cx="7886100" cy="3168026"/>
+          </a:xfrm>
+          <a:prstGeom prst="rect">
+            <a:avLst/>
+          </a:prstGeom>
+        </p:spPr>
+      </p:pic>
+      <p:pic>
+        <p:nvPicPr>
+          <p:cNvPr id="12" name="Grafik 11">
+            <a:extLst>
+              <a:ext uri="{FF2B5EF4-FFF2-40B4-BE49-F238E27FC236}">
+                <a16:creationId xmlns:a16="http://schemas.microsoft.com/office/drawing/2014/main" id="{C6AD0DDD-26D9-AD47-82C8-4A487C77974F}"/>
+              </a:ext>
+            </a:extLst>
+          </p:cNvPr>
+          <p:cNvPicPr>
+            <a:picLocks noChangeAspect="1"/>
+          </p:cNvPicPr>
+          <p:nvPr/>
+        </p:nvPicPr>
+        <p:blipFill>
+          <a:blip r:embed="rId3">
+            <a:extLst>
+              <a:ext uri="{28A0092B-C50C-407E-A947-70E740481C1C}">
+                <a14:useLocalDpi xmlns:a14="http://schemas.microsoft.com/office/drawing/2010/main" val="0"/>
+              </a:ext>
+            </a:extLst>
+          </a:blip>
+          <a:stretch>
+            <a:fillRect/>
+          </a:stretch>
+        </p:blipFill>
+        <p:spPr>
+          <a:xfrm>
+            <a:off x="9211797" y="1340767"/>
+            <a:ext cx="1515642" cy="2736305"/>
+          </a:xfrm>
+          <a:prstGeom prst="rect">
+            <a:avLst/>
+          </a:prstGeom>
+        </p:spPr>
+      </p:pic>
+    </p:spTree>
+    <p:extLst>
+      <p:ext uri="{BB962C8B-B14F-4D97-AF65-F5344CB8AC3E}">
+        <p14:creationId xmlns:p14="http://schemas.microsoft.com/office/powerpoint/2010/main" val="127080024"/>
+      </p:ext>
+    </p:extLst>
+  </p:cSld>
+  <p:clrMapOvr>
+    <a:masterClrMapping/>
+  </p:clrMapOvr>
+  <p:transition>
+    <p:fade/>
+  </p:transition>
+</p:sld>
+</file>
+
+<file path=ppt/slides/slide19.xml><?xml version="1.0" encoding="utf-8"?>
+<p:sld xmlns:a="http://schemas.openxmlformats.org/drawingml/2006/main" xmlns:r="http://schemas.openxmlformats.org/officeDocument/2006/relationships" xmlns:p="http://schemas.openxmlformats.org/presentationml/2006/main">
+  <p:cSld>
+    <p:spTree>
+      <p:nvGrpSpPr>
+        <p:cNvPr id="1" name=""/>
+        <p:cNvGrpSpPr/>
+        <p:nvPr/>
+      </p:nvGrpSpPr>
+      <p:grpSpPr>
+        <a:xfrm>
+          <a:off x="0" y="0"/>
+          <a:ext cx="0" cy="0"/>
+          <a:chOff x="0" y="0"/>
+          <a:chExt cx="0" cy="0"/>
+        </a:xfrm>
+      </p:grpSpPr>
+      <p:sp>
+        <p:nvSpPr>
+          <p:cNvPr id="3" name="Datumsplatzhalter 2">
+            <a:extLst>
+              <a:ext uri="{FF2B5EF4-FFF2-40B4-BE49-F238E27FC236}">
+                <a16:creationId xmlns:a16="http://schemas.microsoft.com/office/drawing/2014/main" id="{0A0714CF-4989-2045-95EB-A9F7CBC37062}"/>
+              </a:ext>
+            </a:extLst>
+          </p:cNvPr>
+          <p:cNvSpPr>
+            <a:spLocks noGrp="1"/>
+          </p:cNvSpPr>
+          <p:nvPr>
+            <p:ph type="dt" sz="half" idx="10"/>
+          </p:nvPr>
+        </p:nvSpPr>
+        <p:spPr/>
+        <p:txBody>
+          <a:bodyPr/>
+          <a:lstStyle/>
+          <a:p>
+            <a:fld id="{CA19FB8E-A97D-E34E-9EA9-C874AD42758F}" type="datetime1">
+              <a:rPr lang="de-CH" smtClean="0"/>
+              <a:t>23.05.18</a:t>
+            </a:fld>
+            <a:endParaRPr lang="en-GB" dirty="0"/>
+          </a:p>
+        </p:txBody>
+      </p:sp>
+      <p:sp>
+        <p:nvSpPr>
+          <p:cNvPr id="4" name="Fußzeilenplatzhalter 3">
+            <a:extLst>
+              <a:ext uri="{FF2B5EF4-FFF2-40B4-BE49-F238E27FC236}">
+                <a16:creationId xmlns:a16="http://schemas.microsoft.com/office/drawing/2014/main" id="{71FE8BEA-0FAC-3B4C-B736-E4C124279AC3}"/>
+              </a:ext>
+            </a:extLst>
+          </p:cNvPr>
+          <p:cNvSpPr>
+            <a:spLocks noGrp="1"/>
+          </p:cNvSpPr>
+          <p:nvPr>
+            <p:ph type="ftr" sz="quarter" idx="11"/>
+          </p:nvPr>
+        </p:nvSpPr>
+        <p:spPr/>
+        <p:txBody>
+          <a:bodyPr/>
+          <a:lstStyle/>
+          <a:p>
+            <a:r>
+              <a:rPr lang="en-GB"/>
+              <a:t>Stefano Weidmann</a:t>
+            </a:r>
+            <a:endParaRPr lang="en-GB" dirty="0"/>
+          </a:p>
+        </p:txBody>
+      </p:sp>
+      <p:sp>
+        <p:nvSpPr>
+          <p:cNvPr id="5" name="Foliennummernplatzhalter 4">
+            <a:extLst>
+              <a:ext uri="{FF2B5EF4-FFF2-40B4-BE49-F238E27FC236}">
+                <a16:creationId xmlns:a16="http://schemas.microsoft.com/office/drawing/2014/main" id="{1CAE4E05-0322-F648-9510-B611C5DAA8C9}"/>
+              </a:ext>
+            </a:extLst>
+          </p:cNvPr>
+          <p:cNvSpPr>
+            <a:spLocks noGrp="1"/>
+          </p:cNvSpPr>
+          <p:nvPr>
+            <p:ph type="sldNum" sz="quarter" idx="12"/>
+          </p:nvPr>
+        </p:nvSpPr>
+        <p:spPr/>
+        <p:txBody>
+          <a:bodyPr/>
+          <a:lstStyle/>
+          <a:p>
+            <a:fld id="{6C6AE60A-B69C-4790-82F7-3882EDF23186}" type="slidenum">
+              <a:rPr lang="en-GB" smtClean="0"/>
+              <a:t>19</a:t>
+            </a:fld>
+            <a:endParaRPr lang="en-GB" dirty="0"/>
+          </a:p>
+        </p:txBody>
+      </p:sp>
+      <p:sp>
+        <p:nvSpPr>
+          <p:cNvPr id="6" name="Titel 5">
+            <a:extLst>
+              <a:ext uri="{FF2B5EF4-FFF2-40B4-BE49-F238E27FC236}">
+                <a16:creationId xmlns:a16="http://schemas.microsoft.com/office/drawing/2014/main" id="{CCFE0345-7E31-2346-87AE-96399679CCD4}"/>
+              </a:ext>
+            </a:extLst>
+          </p:cNvPr>
+          <p:cNvSpPr>
+            <a:spLocks noGrp="1"/>
+          </p:cNvSpPr>
+          <p:nvPr>
+            <p:ph type="title"/>
+          </p:nvPr>
+        </p:nvSpPr>
+        <p:spPr/>
+        <p:txBody>
+          <a:bodyPr/>
+          <a:lstStyle/>
+          <a:p>
+            <a:r>
+              <a:rPr lang="en-US" dirty="0"/>
+              <a:t>Monte Carlo</a:t>
+            </a:r>
+          </a:p>
+        </p:txBody>
+      </p:sp>
+      <p:pic>
+        <p:nvPicPr>
+          <p:cNvPr id="9" name="Grafik 8">
+            <a:extLst>
+              <a:ext uri="{FF2B5EF4-FFF2-40B4-BE49-F238E27FC236}">
+                <a16:creationId xmlns:a16="http://schemas.microsoft.com/office/drawing/2014/main" id="{CC5CECE7-3D6B-DC4D-B0E8-2C3CFEA172D8}"/>
+              </a:ext>
+            </a:extLst>
+          </p:cNvPr>
+          <p:cNvPicPr>
+            <a:picLocks noChangeAspect="1"/>
+          </p:cNvPicPr>
+          <p:nvPr/>
+        </p:nvPicPr>
+        <p:blipFill>
+          <a:blip r:embed="rId2"/>
+          <a:stretch>
+            <a:fillRect/>
+          </a:stretch>
+        </p:blipFill>
+        <p:spPr>
+          <a:xfrm>
+            <a:off x="1845147" y="1916832"/>
+            <a:ext cx="7249579" cy="2617068"/>
+          </a:xfrm>
+          <a:prstGeom prst="rect">
+            <a:avLst/>
+          </a:prstGeom>
+        </p:spPr>
+      </p:pic>
+    </p:spTree>
+    <p:extLst>
+      <p:ext uri="{BB962C8B-B14F-4D97-AF65-F5344CB8AC3E}">
+        <p14:creationId xmlns:p14="http://schemas.microsoft.com/office/powerpoint/2010/main" val="1620502319"/>
       </p:ext>
     </p:extLst>
   </p:cSld>
@@ -42522,6 +44319,249 @@
 </p:sld>
 </file>
 
+<file path=ppt/slides/slide20.xml><?xml version="1.0" encoding="utf-8"?>
+<p:sld xmlns:a="http://schemas.openxmlformats.org/drawingml/2006/main" xmlns:r="http://schemas.openxmlformats.org/officeDocument/2006/relationships" xmlns:p="http://schemas.openxmlformats.org/presentationml/2006/main">
+  <p:cSld>
+    <p:spTree>
+      <p:nvGrpSpPr>
+        <p:cNvPr id="1" name=""/>
+        <p:cNvGrpSpPr/>
+        <p:nvPr/>
+      </p:nvGrpSpPr>
+      <p:grpSpPr>
+        <a:xfrm>
+          <a:off x="0" y="0"/>
+          <a:ext cx="0" cy="0"/>
+          <a:chOff x="0" y="0"/>
+          <a:chExt cx="0" cy="0"/>
+        </a:xfrm>
+      </p:grpSpPr>
+      <p:sp>
+        <p:nvSpPr>
+          <p:cNvPr id="3" name="Datumsplatzhalter 2">
+            <a:extLst>
+              <a:ext uri="{FF2B5EF4-FFF2-40B4-BE49-F238E27FC236}">
+                <a16:creationId xmlns:a16="http://schemas.microsoft.com/office/drawing/2014/main" id="{314DAB1F-A8BA-0840-9D97-C79663AC5B04}"/>
+              </a:ext>
+            </a:extLst>
+          </p:cNvPr>
+          <p:cNvSpPr>
+            <a:spLocks noGrp="1"/>
+          </p:cNvSpPr>
+          <p:nvPr>
+            <p:ph type="dt" sz="half" idx="10"/>
+          </p:nvPr>
+        </p:nvSpPr>
+        <p:spPr/>
+        <p:txBody>
+          <a:bodyPr/>
+          <a:lstStyle/>
+          <a:p>
+            <a:fld id="{CA19FB8E-A97D-E34E-9EA9-C874AD42758F}" type="datetime1">
+              <a:rPr lang="de-CH" smtClean="0"/>
+              <a:t>23.05.18</a:t>
+            </a:fld>
+            <a:endParaRPr lang="en-GB" dirty="0"/>
+          </a:p>
+        </p:txBody>
+      </p:sp>
+      <p:sp>
+        <p:nvSpPr>
+          <p:cNvPr id="4" name="Fußzeilenplatzhalter 3">
+            <a:extLst>
+              <a:ext uri="{FF2B5EF4-FFF2-40B4-BE49-F238E27FC236}">
+                <a16:creationId xmlns:a16="http://schemas.microsoft.com/office/drawing/2014/main" id="{06BCBCC7-4CCB-8245-AC39-5BC0DA4A45E8}"/>
+              </a:ext>
+            </a:extLst>
+          </p:cNvPr>
+          <p:cNvSpPr>
+            <a:spLocks noGrp="1"/>
+          </p:cNvSpPr>
+          <p:nvPr>
+            <p:ph type="ftr" sz="quarter" idx="11"/>
+          </p:nvPr>
+        </p:nvSpPr>
+        <p:spPr/>
+        <p:txBody>
+          <a:bodyPr/>
+          <a:lstStyle/>
+          <a:p>
+            <a:r>
+              <a:rPr lang="en-GB"/>
+              <a:t>Stefano Weidmann</a:t>
+            </a:r>
+            <a:endParaRPr lang="en-GB" dirty="0"/>
+          </a:p>
+        </p:txBody>
+      </p:sp>
+      <p:sp>
+        <p:nvSpPr>
+          <p:cNvPr id="5" name="Foliennummernplatzhalter 4">
+            <a:extLst>
+              <a:ext uri="{FF2B5EF4-FFF2-40B4-BE49-F238E27FC236}">
+                <a16:creationId xmlns:a16="http://schemas.microsoft.com/office/drawing/2014/main" id="{FE4BAB03-901D-B042-8129-D7A14AA7D075}"/>
+              </a:ext>
+            </a:extLst>
+          </p:cNvPr>
+          <p:cNvSpPr>
+            <a:spLocks noGrp="1"/>
+          </p:cNvSpPr>
+          <p:nvPr>
+            <p:ph type="sldNum" sz="quarter" idx="12"/>
+          </p:nvPr>
+        </p:nvSpPr>
+        <p:spPr/>
+        <p:txBody>
+          <a:bodyPr/>
+          <a:lstStyle/>
+          <a:p>
+            <a:fld id="{6C6AE60A-B69C-4790-82F7-3882EDF23186}" type="slidenum">
+              <a:rPr lang="en-GB" smtClean="0"/>
+              <a:t>20</a:t>
+            </a:fld>
+            <a:endParaRPr lang="en-GB" dirty="0"/>
+          </a:p>
+        </p:txBody>
+      </p:sp>
+      <p:sp>
+        <p:nvSpPr>
+          <p:cNvPr id="6" name="Titel 5">
+            <a:extLst>
+              <a:ext uri="{FF2B5EF4-FFF2-40B4-BE49-F238E27FC236}">
+                <a16:creationId xmlns:a16="http://schemas.microsoft.com/office/drawing/2014/main" id="{0E1CC0FA-D11D-8744-9F1B-ED04C79F62A8}"/>
+              </a:ext>
+            </a:extLst>
+          </p:cNvPr>
+          <p:cNvSpPr>
+            <a:spLocks noGrp="1"/>
+          </p:cNvSpPr>
+          <p:nvPr>
+            <p:ph type="title"/>
+          </p:nvPr>
+        </p:nvSpPr>
+        <p:spPr/>
+        <p:txBody>
+          <a:bodyPr/>
+          <a:lstStyle/>
+          <a:p>
+            <a:r>
+              <a:rPr lang="en-US" dirty="0"/>
+              <a:t>Test drive</a:t>
+            </a:r>
+          </a:p>
+        </p:txBody>
+      </p:sp>
+      <p:pic>
+        <p:nvPicPr>
+          <p:cNvPr id="7" name="Grafik 6">
+            <a:extLst>
+              <a:ext uri="{FF2B5EF4-FFF2-40B4-BE49-F238E27FC236}">
+                <a16:creationId xmlns:a16="http://schemas.microsoft.com/office/drawing/2014/main" id="{3FD6784B-97FD-1944-89AA-C050F6902CB8}"/>
+              </a:ext>
+            </a:extLst>
+          </p:cNvPr>
+          <p:cNvPicPr>
+            <a:picLocks noChangeAspect="1"/>
+          </p:cNvPicPr>
+          <p:nvPr/>
+        </p:nvPicPr>
+        <p:blipFill>
+          <a:blip r:embed="rId2"/>
+          <a:stretch>
+            <a:fillRect/>
+          </a:stretch>
+        </p:blipFill>
+        <p:spPr>
+          <a:xfrm>
+            <a:off x="765027" y="1340768"/>
+            <a:ext cx="5127578" cy="2714600"/>
+          </a:xfrm>
+          <a:prstGeom prst="rect">
+            <a:avLst/>
+          </a:prstGeom>
+        </p:spPr>
+      </p:pic>
+      <p:pic>
+        <p:nvPicPr>
+          <p:cNvPr id="8" name="Grafik 7">
+            <a:extLst>
+              <a:ext uri="{FF2B5EF4-FFF2-40B4-BE49-F238E27FC236}">
+                <a16:creationId xmlns:a16="http://schemas.microsoft.com/office/drawing/2014/main" id="{6007C033-5A31-884F-B6DD-E4E245701563}"/>
+              </a:ext>
+            </a:extLst>
+          </p:cNvPr>
+          <p:cNvPicPr>
+            <a:picLocks noChangeAspect="1"/>
+          </p:cNvPicPr>
+          <p:nvPr/>
+        </p:nvPicPr>
+        <p:blipFill>
+          <a:blip r:embed="rId3"/>
+          <a:stretch>
+            <a:fillRect/>
+          </a:stretch>
+        </p:blipFill>
+        <p:spPr>
+          <a:xfrm>
+            <a:off x="921971" y="4775422"/>
+            <a:ext cx="5332401" cy="601107"/>
+          </a:xfrm>
+          <a:prstGeom prst="rect">
+            <a:avLst/>
+          </a:prstGeom>
+        </p:spPr>
+      </p:pic>
+      <p:pic>
+        <p:nvPicPr>
+          <p:cNvPr id="9" name="Inhaltsplatzhalter 7">
+            <a:extLst>
+              <a:ext uri="{FF2B5EF4-FFF2-40B4-BE49-F238E27FC236}">
+                <a16:creationId xmlns:a16="http://schemas.microsoft.com/office/drawing/2014/main" id="{C1D50A3C-7317-9349-8972-4A9E1C1DF9CC}"/>
+              </a:ext>
+            </a:extLst>
+          </p:cNvPr>
+          <p:cNvPicPr>
+            <a:picLocks noGrp="1" noChangeAspect="1"/>
+          </p:cNvPicPr>
+          <p:nvPr>
+            <p:ph idx="1"/>
+          </p:nvPr>
+        </p:nvPicPr>
+        <p:blipFill>
+          <a:blip r:embed="rId4">
+            <a:extLst>
+              <a:ext uri="{28A0092B-C50C-407E-A947-70E740481C1C}">
+                <a14:useLocalDpi xmlns:a14="http://schemas.microsoft.com/office/drawing/2010/main" val="0"/>
+              </a:ext>
+            </a:extLst>
+          </a:blip>
+          <a:stretch>
+            <a:fillRect/>
+          </a:stretch>
+        </p:blipFill>
+        <p:spPr>
+          <a:xfrm>
+            <a:off x="6957715" y="1340768"/>
+            <a:ext cx="4442557" cy="4210050"/>
+          </a:xfrm>
+        </p:spPr>
+      </p:pic>
+    </p:spTree>
+    <p:extLst>
+      <p:ext uri="{BB962C8B-B14F-4D97-AF65-F5344CB8AC3E}">
+        <p14:creationId xmlns:p14="http://schemas.microsoft.com/office/powerpoint/2010/main" val="1322654604"/>
+      </p:ext>
+    </p:extLst>
+  </p:cSld>
+  <p:clrMapOvr>
+    <a:masterClrMapping/>
+  </p:clrMapOvr>
+  <p:transition>
+    <p:fade/>
+  </p:transition>
+</p:sld>
+</file>
+
 <file path=ppt/slides/slide3.xml><?xml version="1.0" encoding="utf-8"?>
 <p:sld xmlns:a="http://schemas.openxmlformats.org/drawingml/2006/main" xmlns:r="http://schemas.openxmlformats.org/officeDocument/2006/relationships" xmlns:p="http://schemas.openxmlformats.org/presentationml/2006/main">
   <p:cSld>
@@ -42839,10 +44879,10 @@
       </p:sp>
       <p:pic>
         <p:nvPicPr>
-          <p:cNvPr id="8" name="Grafik 7">
+          <p:cNvPr id="9" name="Grafik 8">
             <a:extLst>
               <a:ext uri="{FF2B5EF4-FFF2-40B4-BE49-F238E27FC236}">
-                <a16:creationId xmlns:a16="http://schemas.microsoft.com/office/drawing/2014/main" id="{C61D9E54-06FE-4E4A-9608-6C6CD94B88B7}"/>
+                <a16:creationId xmlns:a16="http://schemas.microsoft.com/office/drawing/2014/main" id="{A3ED8C1B-33A9-774C-92C3-2BFE8A026B0E}"/>
               </a:ext>
             </a:extLst>
           </p:cNvPr>
@@ -42859,8 +44899,8 @@
         </p:blipFill>
         <p:spPr>
           <a:xfrm>
-            <a:off x="1019175" y="1340768"/>
-            <a:ext cx="10147300" cy="4241800"/>
+            <a:off x="1075211" y="1340768"/>
+            <a:ext cx="10147300" cy="4648200"/>
           </a:xfrm>
           <a:prstGeom prst="rect">
             <a:avLst/>
@@ -43017,10 +45057,10 @@
       </p:sp>
       <p:pic>
         <p:nvPicPr>
-          <p:cNvPr id="2" name="Grafik 1">
+          <p:cNvPr id="9" name="Grafik 8">
             <a:extLst>
               <a:ext uri="{FF2B5EF4-FFF2-40B4-BE49-F238E27FC236}">
-                <a16:creationId xmlns:a16="http://schemas.microsoft.com/office/drawing/2014/main" id="{ADC4D0EF-1B29-A045-9432-55A22CD9E741}"/>
+                <a16:creationId xmlns:a16="http://schemas.microsoft.com/office/drawing/2014/main" id="{65B9A37E-5FE0-4A43-AAFC-929A19988331}"/>
               </a:ext>
             </a:extLst>
           </p:cNvPr>
@@ -43037,8 +45077,8 @@
         </p:blipFill>
         <p:spPr>
           <a:xfrm>
-            <a:off x="308690" y="1106715"/>
-            <a:ext cx="10868637" cy="4338510"/>
+            <a:off x="367940" y="1268760"/>
+            <a:ext cx="11582310" cy="4626542"/>
           </a:xfrm>
           <a:prstGeom prst="rect">
             <a:avLst/>

</xml_diff>